<commit_message>
alemán vive, la lucha sigue
</commit_message>
<xml_diff>
--- a/otrasMaterias/Präsentation.pptx
+++ b/otrasMaterias/Präsentation.pptx
@@ -110,6 +110,11 @@
       </a:defRPr>
     </a:lvl9pPr>
   </p:defaultTextStyle>
+  <p:extLst>
+    <p:ext uri="{EFAFB233-063F-42B5-8137-9DF3F51BA10A}">
+      <p15:sldGuideLst xmlns:p15="http://schemas.microsoft.com/office/powerpoint/2012/main"/>
+    </p:ext>
+  </p:extLst>
 </p:presentation>
 </file>
 
@@ -387,7 +392,7 @@
           <a:p>
             <a:fld id="{78ABE3C1-DBE1-495D-B57B-2849774B866A}" type="datetimeFigureOut">
               <a:rPr lang="en-US" dirty="0"/>
-              <a:t>4/20/2017</a:t>
+              <a:t>4/25/2017</a:t>
             </a:fld>
             <a:endParaRPr lang="en-US" dirty="0"/>
           </a:p>
@@ -796,7 +801,7 @@
           <a:p>
             <a:fld id="{446C117F-5CCF-4837-BE5F-2B92066CAFAF}" type="datetimeFigureOut">
               <a:rPr lang="en-US" dirty="0"/>
-              <a:t>4/20/2017</a:t>
+              <a:t>4/25/2017</a:t>
             </a:fld>
             <a:endParaRPr lang="en-US" dirty="0"/>
           </a:p>
@@ -1127,7 +1132,7 @@
           <a:p>
             <a:fld id="{84EB90BD-B6CE-46B7-997F-7313B992CCDC}" type="datetimeFigureOut">
               <a:rPr lang="en-US" dirty="0"/>
-              <a:t>4/20/2017</a:t>
+              <a:t>4/25/2017</a:t>
             </a:fld>
             <a:endParaRPr lang="en-US" dirty="0"/>
           </a:p>
@@ -1527,7 +1532,7 @@
           <a:p>
             <a:fld id="{CDB9D11F-B188-461D-B23F-39381795C052}" type="datetimeFigureOut">
               <a:rPr lang="en-US" dirty="0"/>
-              <a:t>4/20/2017</a:t>
+              <a:t>4/25/2017</a:t>
             </a:fld>
             <a:endParaRPr lang="en-US" dirty="0"/>
           </a:p>
@@ -2090,7 +2095,7 @@
           <a:p>
             <a:fld id="{52E6D8D9-55A2-4063-B0F3-121F44549695}" type="datetimeFigureOut">
               <a:rPr lang="en-US" dirty="0"/>
-              <a:t>4/20/2017</a:t>
+              <a:t>4/25/2017</a:t>
             </a:fld>
             <a:endParaRPr lang="en-US" dirty="0"/>
           </a:p>
@@ -2766,7 +2771,7 @@
           <a:p>
             <a:fld id="{D4B24536-994D-4021-A283-9F449C0DB509}" type="datetimeFigureOut">
               <a:rPr lang="en-US" dirty="0"/>
-              <a:t>4/20/2017</a:t>
+              <a:t>4/25/2017</a:t>
             </a:fld>
             <a:endParaRPr lang="en-US" dirty="0"/>
           </a:p>
@@ -3674,7 +3679,7 @@
           <a:p>
             <a:fld id="{3CBBBB78-C96F-47B7-AB17-D852CA960AC9}" type="datetimeFigureOut">
               <a:rPr lang="en-US" dirty="0"/>
-              <a:t>4/20/2017</a:t>
+              <a:t>4/25/2017</a:t>
             </a:fld>
             <a:endParaRPr lang="en-US" dirty="0"/>
           </a:p>
@@ -3982,7 +3987,7 @@
           <a:p>
             <a:fld id="{1FA3F48C-C7C6-4055-9F49-3777875E72AE}" type="datetimeFigureOut">
               <a:rPr lang="en-US" dirty="0"/>
-              <a:t>4/20/2017</a:t>
+              <a:t>4/25/2017</a:t>
             </a:fld>
             <a:endParaRPr lang="en-US" dirty="0"/>
           </a:p>
@@ -4241,7 +4246,7 @@
           <a:p>
             <a:fld id="{6178E61D-D431-422C-9764-11DAFE33AB63}" type="datetimeFigureOut">
               <a:rPr lang="en-US" dirty="0"/>
-              <a:t>4/20/2017</a:t>
+              <a:t>4/25/2017</a:t>
             </a:fld>
             <a:endParaRPr lang="en-US" dirty="0"/>
           </a:p>
@@ -4560,7 +4565,7 @@
           <a:p>
             <a:fld id="{12DE42F4-6EEF-4EF7-8ED4-2208F0F89A08}" type="datetimeFigureOut">
               <a:rPr lang="en-US" dirty="0"/>
-              <a:t>4/20/2017</a:t>
+              <a:t>4/25/2017</a:t>
             </a:fld>
             <a:endParaRPr lang="en-US" dirty="0"/>
           </a:p>
@@ -4944,7 +4949,7 @@
           <a:p>
             <a:fld id="{30578ACC-22D6-47C1-A373-4FD133E34F3C}" type="datetimeFigureOut">
               <a:rPr lang="en-US" dirty="0"/>
-              <a:t>4/20/2017</a:t>
+              <a:t>4/25/2017</a:t>
             </a:fld>
             <a:endParaRPr lang="en-US" dirty="0"/>
           </a:p>
@@ -5315,7 +5320,7 @@
           <a:p>
             <a:fld id="{4E5A6C69-6797-4E8A-BF37-F2C3751466E9}" type="datetimeFigureOut">
               <a:rPr lang="en-US" dirty="0"/>
-              <a:t>4/20/2017</a:t>
+              <a:t>4/25/2017</a:t>
             </a:fld>
             <a:endParaRPr lang="en-US" dirty="0"/>
           </a:p>
@@ -5816,7 +5821,7 @@
           <a:p>
             <a:fld id="{D82014A1-A632-4878-A0D3-F52BA7563730}" type="datetimeFigureOut">
               <a:rPr lang="en-US" dirty="0"/>
-              <a:t>4/20/2017</a:t>
+              <a:t>4/25/2017</a:t>
             </a:fld>
             <a:endParaRPr lang="en-US" dirty="0"/>
           </a:p>
@@ -6068,7 +6073,7 @@
           <a:p>
             <a:fld id="{CE99F462-093F-4566-844B-4C71F2739DA5}" type="datetimeFigureOut">
               <a:rPr lang="en-US" dirty="0"/>
-              <a:t>4/20/2017</a:t>
+              <a:t>4/25/2017</a:t>
             </a:fld>
             <a:endParaRPr lang="en-US" dirty="0"/>
           </a:p>
@@ -6226,7 +6231,7 @@
           <a:p>
             <a:fld id="{3D24A7AC-904D-4781-85BA-7D10C17ED021}" type="datetimeFigureOut">
               <a:rPr lang="en-US" dirty="0"/>
-              <a:t>4/20/2017</a:t>
+              <a:t>4/25/2017</a:t>
             </a:fld>
             <a:endParaRPr lang="en-US" dirty="0"/>
           </a:p>
@@ -6611,7 +6616,7 @@
           <a:p>
             <a:fld id="{E331444B-B92B-4E27-8C94-BB93EAF5CB18}" type="datetimeFigureOut">
               <a:rPr lang="en-US" dirty="0"/>
-              <a:t>4/20/2017</a:t>
+              <a:t>4/25/2017</a:t>
             </a:fld>
             <a:endParaRPr lang="en-US" dirty="0"/>
           </a:p>
@@ -7015,7 +7020,7 @@
           <a:p>
             <a:fld id="{363EFA5E-FA76-400D-B3DC-F0BA90E6D107}" type="datetimeFigureOut">
               <a:rPr lang="en-US" dirty="0"/>
-              <a:t>4/20/2017</a:t>
+              <a:t>4/25/2017</a:t>
             </a:fld>
             <a:endParaRPr lang="en-US" dirty="0"/>
           </a:p>
@@ -7254,7 +7259,7 @@
           <a:p>
             <a:fld id="{9D6E9DEC-419B-4CC5-A080-3B06BD5A8291}" type="datetimeFigureOut">
               <a:rPr lang="en-US" dirty="0"/>
-              <a:t>4/20/2017</a:t>
+              <a:t>4/25/2017</a:t>
             </a:fld>
             <a:endParaRPr lang="en-US" dirty="0"/>
           </a:p>
@@ -8198,7 +8203,7 @@
             </a:r>
             <a:r>
               <a:rPr lang="es-CO" dirty="0" err="1"/>
-              <a:t>habe</a:t>
+              <a:t>hat</a:t>
             </a:r>
             <a:r>
               <a:rPr lang="es-CO" dirty="0"/>
@@ -8272,7 +8277,15 @@
             </a:r>
             <a:r>
               <a:rPr lang="es-CO" dirty="0" err="1"/>
-              <a:t>Kühlschrankes</a:t>
+              <a:t>Kühlschranke</a:t>
+            </a:r>
+            <a:r>
+              <a:rPr lang="es-CO" dirty="0"/>
+              <a:t>, </a:t>
+            </a:r>
+            <a:r>
+              <a:rPr lang="es-CO" dirty="0" err="1"/>
+              <a:t>dann</a:t>
             </a:r>
             <a:r>
               <a:rPr lang="es-CO" dirty="0"/>
@@ -8280,7 +8293,7 @@
             </a:r>
             <a:r>
               <a:rPr lang="es-CO" dirty="0" err="1"/>
-              <a:t>dann</a:t>
+              <a:t>brauchen</a:t>
             </a:r>
             <a:r>
               <a:rPr lang="es-CO" dirty="0"/>
@@ -8288,7 +8301,7 @@
             </a:r>
             <a:r>
               <a:rPr lang="es-CO" dirty="0" err="1"/>
-              <a:t>brauchen</a:t>
+              <a:t>wir</a:t>
             </a:r>
             <a:r>
               <a:rPr lang="es-CO" dirty="0"/>
@@ -8296,7 +8309,7 @@
             </a:r>
             <a:r>
               <a:rPr lang="es-CO" dirty="0" err="1"/>
-              <a:t>wir</a:t>
+              <a:t>nicht</a:t>
             </a:r>
             <a:r>
               <a:rPr lang="es-CO" dirty="0"/>
@@ -8304,7 +8317,7 @@
             </a:r>
             <a:r>
               <a:rPr lang="es-CO" dirty="0" err="1"/>
-              <a:t>nicht</a:t>
+              <a:t>mehr</a:t>
             </a:r>
             <a:r>
               <a:rPr lang="es-CO" dirty="0"/>
@@ -8312,7 +8325,7 @@
             </a:r>
             <a:r>
               <a:rPr lang="es-CO" dirty="0" err="1"/>
-              <a:t>mehr</a:t>
+              <a:t>Fleisch</a:t>
             </a:r>
             <a:r>
               <a:rPr lang="es-CO" dirty="0"/>
@@ -8320,15 +8333,7 @@
             </a:r>
             <a:r>
               <a:rPr lang="es-CO" dirty="0" err="1"/>
-              <a:t>Fleisch</a:t>
-            </a:r>
-            <a:r>
-              <a:rPr lang="es-CO" dirty="0"/>
-              <a:t> </a:t>
-            </a:r>
-            <a:r>
-              <a:rPr lang="es-CO" dirty="0" err="1"/>
-              <a:t>rauchen</a:t>
+              <a:t>räuchern</a:t>
             </a:r>
             <a:r>
               <a:rPr lang="es-CO" dirty="0"/>
@@ -8425,7 +8430,7 @@
             </a:r>
             <a:r>
               <a:rPr lang="es-CO" b="1" dirty="0" err="1"/>
-              <a:t>hatten</a:t>
+              <a:t>hattendamals</a:t>
             </a:r>
             <a:r>
               <a:rPr lang="es-CO" b="1" dirty="0"/>
@@ -8450,8 +8455,12 @@
           </a:p>
           <a:p>
             <a:r>
+              <a:rPr lang="es-CO" b="1" dirty="0" err="1"/>
+              <a:t>Räuchern</a:t>
+            </a:r>
+            <a:r>
               <a:rPr lang="es-CO" b="1" dirty="0"/>
-              <a:t>Rauch </a:t>
+              <a:t> </a:t>
             </a:r>
             <a:r>
               <a:rPr lang="es-CO" b="1" dirty="0" err="1"/>
@@ -8463,7 +8472,7 @@
             </a:r>
             <a:r>
               <a:rPr lang="es-CO" b="1" dirty="0" err="1"/>
-              <a:t>trocknen</a:t>
+              <a:t>einsalzen</a:t>
             </a:r>
             <a:r>
               <a:rPr lang="es-CO" b="1" dirty="0"/>
@@ -8503,7 +8512,7 @@
             </a:r>
             <a:r>
               <a:rPr lang="es-CO" b="1" dirty="0" err="1"/>
-              <a:t>trocknen</a:t>
+              <a:t>einsalzen</a:t>
             </a:r>
             <a:r>
               <a:rPr lang="es-CO" b="1" dirty="0"/>
@@ -8603,7 +8612,15 @@
             </a:r>
             <a:r>
               <a:rPr lang="es-CO" b="1" dirty="0" err="1"/>
-              <a:t>verfaulen</a:t>
+              <a:t>kaputt</a:t>
+            </a:r>
+            <a:r>
+              <a:rPr lang="es-CO" b="1" dirty="0"/>
+              <a:t> </a:t>
+            </a:r>
+            <a:r>
+              <a:rPr lang="es-CO" b="1" dirty="0" err="1"/>
+              <a:t>gehen</a:t>
             </a:r>
             <a:r>
               <a:rPr lang="es-CO" b="1" dirty="0"/>
@@ -8968,6 +8985,14 @@
             </a:r>
             <a:r>
               <a:rPr lang="es-CO" dirty="0"/>
+              <a:t> </a:t>
+            </a:r>
+            <a:r>
+              <a:rPr lang="es-CO" dirty="0" err="1"/>
+              <a:t>man</a:t>
+            </a:r>
+            <a:r>
+              <a:rPr lang="es-CO" dirty="0"/>
               <a:t> den </a:t>
             </a:r>
             <a:r>
@@ -9018,7 +9043,7 @@
             </a:r>
             <a:r>
               <a:rPr lang="es-CO" dirty="0" err="1"/>
-              <a:t>füllt</a:t>
+              <a:t>ist</a:t>
             </a:r>
             <a:r>
               <a:rPr lang="es-CO" dirty="0"/>
@@ -9030,7 +9055,15 @@
             </a:r>
             <a:r>
               <a:rPr lang="es-CO" dirty="0"/>
-              <a:t> Rauch</a:t>
+              <a:t> Rauch </a:t>
+            </a:r>
+            <a:r>
+              <a:rPr lang="es-CO" dirty="0" err="1"/>
+              <a:t>gefüllt</a:t>
+            </a:r>
+            <a:r>
+              <a:rPr lang="es-CO" dirty="0"/>
+              <a:t>.</a:t>
             </a:r>
           </a:p>
           <a:p>
@@ -9194,17 +9227,41 @@
         </p:spPr>
         <p:txBody>
           <a:bodyPr>
-            <a:normAutofit/>
+            <a:normAutofit lnSpcReduction="10000"/>
           </a:bodyPr>
           <a:lstStyle/>
           <a:p>
             <a:r>
               <a:rPr lang="es-CO" dirty="0" err="1"/>
-              <a:t>Kalter</a:t>
+              <a:t>Wenn</a:t>
             </a:r>
             <a:r>
               <a:rPr lang="es-CO" dirty="0"/>
-              <a:t> Rauch (28°C -32°C)</a:t>
+              <a:t> es </a:t>
+            </a:r>
+            <a:r>
+              <a:rPr lang="es-CO" dirty="0" err="1"/>
+              <a:t>kalt</a:t>
+            </a:r>
+            <a:r>
+              <a:rPr lang="es-CO" dirty="0"/>
+              <a:t> (28°C -32°C) </a:t>
+            </a:r>
+            <a:r>
+              <a:rPr lang="es-CO" dirty="0" err="1"/>
+              <a:t>geräuchert</a:t>
+            </a:r>
+            <a:r>
+              <a:rPr lang="es-CO" dirty="0"/>
+              <a:t> </a:t>
+            </a:r>
+            <a:r>
+              <a:rPr lang="es-CO" dirty="0" err="1"/>
+              <a:t>wird</a:t>
+            </a:r>
+            <a:r>
+              <a:rPr lang="es-CO" dirty="0"/>
+              <a:t>.</a:t>
             </a:r>
           </a:p>
         </p:txBody>
@@ -9249,16 +9306,42 @@
           </a:xfrm>
         </p:spPr>
         <p:txBody>
-          <a:bodyPr/>
+          <a:bodyPr>
+            <a:normAutofit lnSpcReduction="10000"/>
+          </a:bodyPr>
           <a:lstStyle/>
           <a:p>
             <a:r>
               <a:rPr lang="es-CO" dirty="0" err="1"/>
-              <a:t>Warmer</a:t>
+              <a:t>Wenn</a:t>
             </a:r>
             <a:r>
               <a:rPr lang="es-CO" dirty="0"/>
-              <a:t> Rauch (70°C-80°C)</a:t>
+              <a:t> es </a:t>
+            </a:r>
+            <a:r>
+              <a:rPr lang="es-CO" dirty="0" err="1"/>
+              <a:t>warm</a:t>
+            </a:r>
+            <a:r>
+              <a:rPr lang="es-CO" dirty="0"/>
+              <a:t> (70°C -80°C) </a:t>
+            </a:r>
+            <a:r>
+              <a:rPr lang="es-CO" dirty="0" err="1"/>
+              <a:t>geräuchert</a:t>
+            </a:r>
+            <a:r>
+              <a:rPr lang="es-CO" dirty="0"/>
+              <a:t> </a:t>
+            </a:r>
+            <a:r>
+              <a:rPr lang="es-CO" dirty="0" err="1"/>
+              <a:t>wird</a:t>
+            </a:r>
+            <a:r>
+              <a:rPr lang="es-CO" dirty="0"/>
+              <a:t>.</a:t>
             </a:r>
           </a:p>
         </p:txBody>

</xml_diff>